<commit_message>
Actualizacion de stands y listados
</commit_message>
<xml_diff>
--- a/descargas/cartel_expoproyectos.pptx
+++ b/descargas/cartel_expoproyectos.pptx
@@ -4,6 +4,9 @@
   <p:sldMasterIdLst>
     <p:sldMasterId id="2147483648" r:id="rId1"/>
   </p:sldMasterIdLst>
+  <p:notesMasterIdLst>
+    <p:notesMasterId r:id="rId3"/>
+  </p:notesMasterIdLst>
   <p:sldIdLst>
     <p:sldId id="256" r:id="rId2"/>
   </p:sldIdLst>
@@ -104,7 +107,457 @@
       </a:defRPr>
     </a:lvl9pPr>
   </p:defaultTextStyle>
+  <p:extLst>
+    <p:ext uri="{EFAFB233-063F-42B5-8137-9DF3F51BA10A}">
+      <p15:sldGuideLst xmlns:p15="http://schemas.microsoft.com/office/powerpoint/2012/main">
+        <p15:guide id="1" orient="horz" pos="9072">
+          <p15:clr>
+            <a:srgbClr val="A4A3A4"/>
+          </p15:clr>
+        </p15:guide>
+        <p15:guide id="2" pos="6806">
+          <p15:clr>
+            <a:srgbClr val="A4A3A4"/>
+          </p15:clr>
+        </p15:guide>
+      </p15:sldGuideLst>
+    </p:ext>
+  </p:extLst>
 </p:presentation>
+</file>
+
+<file path=ppt/notesMasters/notesMaster1.xml><?xml version="1.0" encoding="utf-8"?>
+<p:notesMaster xmlns:a="http://schemas.openxmlformats.org/drawingml/2006/main" xmlns:r="http://schemas.openxmlformats.org/officeDocument/2006/relationships" xmlns:p="http://schemas.openxmlformats.org/presentationml/2006/main">
+  <p:cSld>
+    <p:bg>
+      <p:bgRef idx="1001">
+        <a:schemeClr val="bg1"/>
+      </p:bgRef>
+    </p:bg>
+    <p:spTree>
+      <p:nvGrpSpPr>
+        <p:cNvPr id="1" name=""/>
+        <p:cNvGrpSpPr/>
+        <p:nvPr/>
+      </p:nvGrpSpPr>
+      <p:grpSpPr>
+        <a:xfrm>
+          <a:off x="0" y="0"/>
+          <a:ext cx="0" cy="0"/>
+          <a:chOff x="0" y="0"/>
+          <a:chExt cx="0" cy="0"/>
+        </a:xfrm>
+      </p:grpSpPr>
+      <p:sp>
+        <p:nvSpPr>
+          <p:cNvPr id="2" name="Marcador de encabezado 1"/>
+          <p:cNvSpPr>
+            <a:spLocks noGrp="1"/>
+          </p:cNvSpPr>
+          <p:nvPr>
+            <p:ph type="hdr" sz="quarter"/>
+          </p:nvPr>
+        </p:nvSpPr>
+        <p:spPr>
+          <a:xfrm>
+            <a:off x="0" y="0"/>
+            <a:ext cx="2971800" cy="458788"/>
+          </a:xfrm>
+          <a:prstGeom prst="rect">
+            <a:avLst/>
+          </a:prstGeom>
+        </p:spPr>
+        <p:txBody>
+          <a:bodyPr vert="horz" lIns="91440" tIns="45720" rIns="91440" bIns="45720" rtlCol="0"/>
+          <a:lstStyle>
+            <a:lvl1pPr algn="l">
+              <a:defRPr sz="1200"/>
+            </a:lvl1pPr>
+          </a:lstStyle>
+          <a:p>
+            <a:endParaRPr lang="es-MX"/>
+          </a:p>
+        </p:txBody>
+      </p:sp>
+      <p:sp>
+        <p:nvSpPr>
+          <p:cNvPr id="3" name="Marcador de fecha 2"/>
+          <p:cNvSpPr>
+            <a:spLocks noGrp="1"/>
+          </p:cNvSpPr>
+          <p:nvPr>
+            <p:ph type="dt" idx="1"/>
+          </p:nvPr>
+        </p:nvSpPr>
+        <p:spPr>
+          <a:xfrm>
+            <a:off x="3884613" y="0"/>
+            <a:ext cx="2971800" cy="458788"/>
+          </a:xfrm>
+          <a:prstGeom prst="rect">
+            <a:avLst/>
+          </a:prstGeom>
+        </p:spPr>
+        <p:txBody>
+          <a:bodyPr vert="horz" lIns="91440" tIns="45720" rIns="91440" bIns="45720" rtlCol="0"/>
+          <a:lstStyle>
+            <a:lvl1pPr algn="r">
+              <a:defRPr sz="1200"/>
+            </a:lvl1pPr>
+          </a:lstStyle>
+          <a:p>
+            <a:fld id="{1600F787-CF98-46F3-A586-10997A4E021C}" type="datetimeFigureOut">
+              <a:rPr lang="es-MX" smtClean="0"/>
+              <a:t>31/10/2019</a:t>
+            </a:fld>
+            <a:endParaRPr lang="es-MX"/>
+          </a:p>
+        </p:txBody>
+      </p:sp>
+      <p:sp>
+        <p:nvSpPr>
+          <p:cNvPr id="4" name="Marcador de imagen de diapositiva 3"/>
+          <p:cNvSpPr>
+            <a:spLocks noGrp="1" noRot="1" noChangeAspect="1"/>
+          </p:cNvSpPr>
+          <p:nvPr>
+            <p:ph type="sldImg" idx="2"/>
+          </p:nvPr>
+        </p:nvSpPr>
+        <p:spPr>
+          <a:xfrm>
+            <a:off x="2271713" y="1143000"/>
+            <a:ext cx="2314575" cy="3086100"/>
+          </a:xfrm>
+          <a:prstGeom prst="rect">
+            <a:avLst/>
+          </a:prstGeom>
+          <a:noFill/>
+          <a:ln w="12700">
+            <a:solidFill>
+              <a:prstClr val="black"/>
+            </a:solidFill>
+          </a:ln>
+        </p:spPr>
+        <p:txBody>
+          <a:bodyPr vert="horz" lIns="91440" tIns="45720" rIns="91440" bIns="45720" rtlCol="0" anchor="ctr"/>
+          <a:lstStyle/>
+          <a:p>
+            <a:endParaRPr lang="es-MX"/>
+          </a:p>
+        </p:txBody>
+      </p:sp>
+      <p:sp>
+        <p:nvSpPr>
+          <p:cNvPr id="5" name="Marcador de notas 4"/>
+          <p:cNvSpPr>
+            <a:spLocks noGrp="1"/>
+          </p:cNvSpPr>
+          <p:nvPr>
+            <p:ph type="body" sz="quarter" idx="3"/>
+          </p:nvPr>
+        </p:nvSpPr>
+        <p:spPr>
+          <a:xfrm>
+            <a:off x="685800" y="4400550"/>
+            <a:ext cx="5486400" cy="3600450"/>
+          </a:xfrm>
+          <a:prstGeom prst="rect">
+            <a:avLst/>
+          </a:prstGeom>
+        </p:spPr>
+        <p:txBody>
+          <a:bodyPr vert="horz" lIns="91440" tIns="45720" rIns="91440" bIns="45720" rtlCol="0"/>
+          <a:lstStyle/>
+          <a:p>
+            <a:pPr lvl="0"/>
+            <a:r>
+              <a:rPr lang="es-ES" smtClean="0"/>
+              <a:t>Haga clic para modificar el estilo de texto del patrón</a:t>
+            </a:r>
+          </a:p>
+          <a:p>
+            <a:pPr lvl="1"/>
+            <a:r>
+              <a:rPr lang="es-ES" smtClean="0"/>
+              <a:t>Segundo nivel</a:t>
+            </a:r>
+          </a:p>
+          <a:p>
+            <a:pPr lvl="2"/>
+            <a:r>
+              <a:rPr lang="es-ES" smtClean="0"/>
+              <a:t>Tercer nivel</a:t>
+            </a:r>
+          </a:p>
+          <a:p>
+            <a:pPr lvl="3"/>
+            <a:r>
+              <a:rPr lang="es-ES" smtClean="0"/>
+              <a:t>Cuarto nivel</a:t>
+            </a:r>
+          </a:p>
+          <a:p>
+            <a:pPr lvl="4"/>
+            <a:r>
+              <a:rPr lang="es-ES" smtClean="0"/>
+              <a:t>Quinto nivel</a:t>
+            </a:r>
+            <a:endParaRPr lang="es-MX"/>
+          </a:p>
+        </p:txBody>
+      </p:sp>
+      <p:sp>
+        <p:nvSpPr>
+          <p:cNvPr id="6" name="Marcador de pie de página 5"/>
+          <p:cNvSpPr>
+            <a:spLocks noGrp="1"/>
+          </p:cNvSpPr>
+          <p:nvPr>
+            <p:ph type="ftr" sz="quarter" idx="4"/>
+          </p:nvPr>
+        </p:nvSpPr>
+        <p:spPr>
+          <a:xfrm>
+            <a:off x="0" y="8685213"/>
+            <a:ext cx="2971800" cy="458787"/>
+          </a:xfrm>
+          <a:prstGeom prst="rect">
+            <a:avLst/>
+          </a:prstGeom>
+        </p:spPr>
+        <p:txBody>
+          <a:bodyPr vert="horz" lIns="91440" tIns="45720" rIns="91440" bIns="45720" rtlCol="0" anchor="b"/>
+          <a:lstStyle>
+            <a:lvl1pPr algn="l">
+              <a:defRPr sz="1200"/>
+            </a:lvl1pPr>
+          </a:lstStyle>
+          <a:p>
+            <a:endParaRPr lang="es-MX"/>
+          </a:p>
+        </p:txBody>
+      </p:sp>
+      <p:sp>
+        <p:nvSpPr>
+          <p:cNvPr id="7" name="Marcador de número de diapositiva 6"/>
+          <p:cNvSpPr>
+            <a:spLocks noGrp="1"/>
+          </p:cNvSpPr>
+          <p:nvPr>
+            <p:ph type="sldNum" sz="quarter" idx="5"/>
+          </p:nvPr>
+        </p:nvSpPr>
+        <p:spPr>
+          <a:xfrm>
+            <a:off x="3884613" y="8685213"/>
+            <a:ext cx="2971800" cy="458787"/>
+          </a:xfrm>
+          <a:prstGeom prst="rect">
+            <a:avLst/>
+          </a:prstGeom>
+        </p:spPr>
+        <p:txBody>
+          <a:bodyPr vert="horz" lIns="91440" tIns="45720" rIns="91440" bIns="45720" rtlCol="0" anchor="b"/>
+          <a:lstStyle>
+            <a:lvl1pPr algn="r">
+              <a:defRPr sz="1200"/>
+            </a:lvl1pPr>
+          </a:lstStyle>
+          <a:p>
+            <a:fld id="{039FB5F3-36DA-481B-A887-78D7E82BC517}" type="slidenum">
+              <a:rPr lang="es-MX" smtClean="0"/>
+              <a:t>‹Nº›</a:t>
+            </a:fld>
+            <a:endParaRPr lang="es-MX"/>
+          </a:p>
+        </p:txBody>
+      </p:sp>
+    </p:spTree>
+    <p:extLst>
+      <p:ext uri="{BB962C8B-B14F-4D97-AF65-F5344CB8AC3E}">
+        <p14:creationId xmlns:p14="http://schemas.microsoft.com/office/powerpoint/2010/main" val="1644531578"/>
+      </p:ext>
+    </p:extLst>
+  </p:cSld>
+  <p:clrMap bg1="lt1" tx1="dk1" bg2="lt2" tx2="dk2" accent1="accent1" accent2="accent2" accent3="accent3" accent4="accent4" accent5="accent5" accent6="accent6" hlink="hlink" folHlink="folHlink"/>
+  <p:notesStyle>
+    <a:lvl1pPr marL="0" algn="l" defTabSz="914400" rtl="0" eaLnBrk="1" latinLnBrk="0" hangingPunct="1">
+      <a:defRPr sz="1200" kern="1200">
+        <a:solidFill>
+          <a:schemeClr val="tx1"/>
+        </a:solidFill>
+        <a:latin typeface="+mn-lt"/>
+        <a:ea typeface="+mn-ea"/>
+        <a:cs typeface="+mn-cs"/>
+      </a:defRPr>
+    </a:lvl1pPr>
+    <a:lvl2pPr marL="457200" algn="l" defTabSz="914400" rtl="0" eaLnBrk="1" latinLnBrk="0" hangingPunct="1">
+      <a:defRPr sz="1200" kern="1200">
+        <a:solidFill>
+          <a:schemeClr val="tx1"/>
+        </a:solidFill>
+        <a:latin typeface="+mn-lt"/>
+        <a:ea typeface="+mn-ea"/>
+        <a:cs typeface="+mn-cs"/>
+      </a:defRPr>
+    </a:lvl2pPr>
+    <a:lvl3pPr marL="914400" algn="l" defTabSz="914400" rtl="0" eaLnBrk="1" latinLnBrk="0" hangingPunct="1">
+      <a:defRPr sz="1200" kern="1200">
+        <a:solidFill>
+          <a:schemeClr val="tx1"/>
+        </a:solidFill>
+        <a:latin typeface="+mn-lt"/>
+        <a:ea typeface="+mn-ea"/>
+        <a:cs typeface="+mn-cs"/>
+      </a:defRPr>
+    </a:lvl3pPr>
+    <a:lvl4pPr marL="1371600" algn="l" defTabSz="914400" rtl="0" eaLnBrk="1" latinLnBrk="0" hangingPunct="1">
+      <a:defRPr sz="1200" kern="1200">
+        <a:solidFill>
+          <a:schemeClr val="tx1"/>
+        </a:solidFill>
+        <a:latin typeface="+mn-lt"/>
+        <a:ea typeface="+mn-ea"/>
+        <a:cs typeface="+mn-cs"/>
+      </a:defRPr>
+    </a:lvl4pPr>
+    <a:lvl5pPr marL="1828800" algn="l" defTabSz="914400" rtl="0" eaLnBrk="1" latinLnBrk="0" hangingPunct="1">
+      <a:defRPr sz="1200" kern="1200">
+        <a:solidFill>
+          <a:schemeClr val="tx1"/>
+        </a:solidFill>
+        <a:latin typeface="+mn-lt"/>
+        <a:ea typeface="+mn-ea"/>
+        <a:cs typeface="+mn-cs"/>
+      </a:defRPr>
+    </a:lvl5pPr>
+    <a:lvl6pPr marL="2286000" algn="l" defTabSz="914400" rtl="0" eaLnBrk="1" latinLnBrk="0" hangingPunct="1">
+      <a:defRPr sz="1200" kern="1200">
+        <a:solidFill>
+          <a:schemeClr val="tx1"/>
+        </a:solidFill>
+        <a:latin typeface="+mn-lt"/>
+        <a:ea typeface="+mn-ea"/>
+        <a:cs typeface="+mn-cs"/>
+      </a:defRPr>
+    </a:lvl6pPr>
+    <a:lvl7pPr marL="2743200" algn="l" defTabSz="914400" rtl="0" eaLnBrk="1" latinLnBrk="0" hangingPunct="1">
+      <a:defRPr sz="1200" kern="1200">
+        <a:solidFill>
+          <a:schemeClr val="tx1"/>
+        </a:solidFill>
+        <a:latin typeface="+mn-lt"/>
+        <a:ea typeface="+mn-ea"/>
+        <a:cs typeface="+mn-cs"/>
+      </a:defRPr>
+    </a:lvl7pPr>
+    <a:lvl8pPr marL="3200400" algn="l" defTabSz="914400" rtl="0" eaLnBrk="1" latinLnBrk="0" hangingPunct="1">
+      <a:defRPr sz="1200" kern="1200">
+        <a:solidFill>
+          <a:schemeClr val="tx1"/>
+        </a:solidFill>
+        <a:latin typeface="+mn-lt"/>
+        <a:ea typeface="+mn-ea"/>
+        <a:cs typeface="+mn-cs"/>
+      </a:defRPr>
+    </a:lvl8pPr>
+    <a:lvl9pPr marL="3657600" algn="l" defTabSz="914400" rtl="0" eaLnBrk="1" latinLnBrk="0" hangingPunct="1">
+      <a:defRPr sz="1200" kern="1200">
+        <a:solidFill>
+          <a:schemeClr val="tx1"/>
+        </a:solidFill>
+        <a:latin typeface="+mn-lt"/>
+        <a:ea typeface="+mn-ea"/>
+        <a:cs typeface="+mn-cs"/>
+      </a:defRPr>
+    </a:lvl9pPr>
+  </p:notesStyle>
+</p:notesMaster>
+</file>
+
+<file path=ppt/notesSlides/notesSlide1.xml><?xml version="1.0" encoding="utf-8"?>
+<p:notes xmlns:a="http://schemas.openxmlformats.org/drawingml/2006/main" xmlns:r="http://schemas.openxmlformats.org/officeDocument/2006/relationships" xmlns:p="http://schemas.openxmlformats.org/presentationml/2006/main">
+  <p:cSld>
+    <p:spTree>
+      <p:nvGrpSpPr>
+        <p:cNvPr id="1" name=""/>
+        <p:cNvGrpSpPr/>
+        <p:nvPr/>
+      </p:nvGrpSpPr>
+      <p:grpSpPr>
+        <a:xfrm>
+          <a:off x="0" y="0"/>
+          <a:ext cx="0" cy="0"/>
+          <a:chOff x="0" y="0"/>
+          <a:chExt cx="0" cy="0"/>
+        </a:xfrm>
+      </p:grpSpPr>
+      <p:sp>
+        <p:nvSpPr>
+          <p:cNvPr id="2" name="Marcador de imagen de diapositiva 1"/>
+          <p:cNvSpPr>
+            <a:spLocks noGrp="1" noRot="1" noChangeAspect="1"/>
+          </p:cNvSpPr>
+          <p:nvPr>
+            <p:ph type="sldImg"/>
+          </p:nvPr>
+        </p:nvSpPr>
+        <p:spPr/>
+      </p:sp>
+      <p:sp>
+        <p:nvSpPr>
+          <p:cNvPr id="3" name="Marcador de notas 2"/>
+          <p:cNvSpPr>
+            <a:spLocks noGrp="1"/>
+          </p:cNvSpPr>
+          <p:nvPr>
+            <p:ph type="body" idx="1"/>
+          </p:nvPr>
+        </p:nvSpPr>
+        <p:spPr/>
+        <p:txBody>
+          <a:bodyPr/>
+          <a:lstStyle/>
+          <a:p>
+            <a:endParaRPr lang="es-MX" dirty="0"/>
+          </a:p>
+        </p:txBody>
+      </p:sp>
+      <p:sp>
+        <p:nvSpPr>
+          <p:cNvPr id="4" name="Marcador de número de diapositiva 3"/>
+          <p:cNvSpPr>
+            <a:spLocks noGrp="1"/>
+          </p:cNvSpPr>
+          <p:nvPr>
+            <p:ph type="sldNum" sz="quarter" idx="10"/>
+          </p:nvPr>
+        </p:nvSpPr>
+        <p:spPr/>
+        <p:txBody>
+          <a:bodyPr/>
+          <a:lstStyle/>
+          <a:p>
+            <a:fld id="{039FB5F3-36DA-481B-A887-78D7E82BC517}" type="slidenum">
+              <a:rPr lang="es-MX" smtClean="0"/>
+              <a:t>1</a:t>
+            </a:fld>
+            <a:endParaRPr lang="es-MX"/>
+          </a:p>
+        </p:txBody>
+      </p:sp>
+    </p:spTree>
+    <p:extLst>
+      <p:ext uri="{BB962C8B-B14F-4D97-AF65-F5344CB8AC3E}">
+        <p14:creationId xmlns:p14="http://schemas.microsoft.com/office/powerpoint/2010/main" val="4913729"/>
+      </p:ext>
+    </p:extLst>
+  </p:cSld>
+  <p:clrMapOvr>
+    <a:masterClrMapping/>
+  </p:clrMapOvr>
+</p:notes>
 </file>
 
 <file path=ppt/slideLayouts/slideLayout1.xml><?xml version="1.0" encoding="utf-8"?>
@@ -288,7 +741,7 @@
           <a:p>
             <a:fld id="{6311D5E6-ECD3-4240-9AD7-3B7A7170C22A}" type="datetimeFigureOut">
               <a:rPr lang="es-ES" smtClean="0"/>
-              <a:t>23/10/19</a:t>
+              <a:t>31/10/2019</a:t>
             </a:fld>
             <a:endParaRPr lang="es-ES"/>
           </a:p>
@@ -330,7 +783,7 @@
           <a:p>
             <a:fld id="{E3F820F1-0728-A74F-B087-595E4E205F26}" type="slidenum">
               <a:rPr lang="es-ES" smtClean="0"/>
-              <a:t>‹Nr.›</a:t>
+              <a:t>‹Nº›</a:t>
             </a:fld>
             <a:endParaRPr lang="es-ES"/>
           </a:p>
@@ -458,7 +911,7 @@
           <a:p>
             <a:fld id="{6311D5E6-ECD3-4240-9AD7-3B7A7170C22A}" type="datetimeFigureOut">
               <a:rPr lang="es-ES" smtClean="0"/>
-              <a:t>23/10/19</a:t>
+              <a:t>31/10/2019</a:t>
             </a:fld>
             <a:endParaRPr lang="es-ES"/>
           </a:p>
@@ -500,7 +953,7 @@
           <a:p>
             <a:fld id="{E3F820F1-0728-A74F-B087-595E4E205F26}" type="slidenum">
               <a:rPr lang="es-ES" smtClean="0"/>
-              <a:t>‹Nr.›</a:t>
+              <a:t>‹Nº›</a:t>
             </a:fld>
             <a:endParaRPr lang="es-ES"/>
           </a:p>
@@ -638,7 +1091,7 @@
           <a:p>
             <a:fld id="{6311D5E6-ECD3-4240-9AD7-3B7A7170C22A}" type="datetimeFigureOut">
               <a:rPr lang="es-ES" smtClean="0"/>
-              <a:t>23/10/19</a:t>
+              <a:t>31/10/2019</a:t>
             </a:fld>
             <a:endParaRPr lang="es-ES"/>
           </a:p>
@@ -680,7 +1133,7 @@
           <a:p>
             <a:fld id="{E3F820F1-0728-A74F-B087-595E4E205F26}" type="slidenum">
               <a:rPr lang="es-ES" smtClean="0"/>
-              <a:t>‹Nr.›</a:t>
+              <a:t>‹Nº›</a:t>
             </a:fld>
             <a:endParaRPr lang="es-ES"/>
           </a:p>
@@ -808,7 +1261,7 @@
           <a:p>
             <a:fld id="{6311D5E6-ECD3-4240-9AD7-3B7A7170C22A}" type="datetimeFigureOut">
               <a:rPr lang="es-ES" smtClean="0"/>
-              <a:t>23/10/19</a:t>
+              <a:t>31/10/2019</a:t>
             </a:fld>
             <a:endParaRPr lang="es-ES"/>
           </a:p>
@@ -850,7 +1303,7 @@
           <a:p>
             <a:fld id="{E3F820F1-0728-A74F-B087-595E4E205F26}" type="slidenum">
               <a:rPr lang="es-ES" smtClean="0"/>
-              <a:t>‹Nr.›</a:t>
+              <a:t>‹Nº›</a:t>
             </a:fld>
             <a:endParaRPr lang="es-ES"/>
           </a:p>
@@ -1054,7 +1507,7 @@
           <a:p>
             <a:fld id="{6311D5E6-ECD3-4240-9AD7-3B7A7170C22A}" type="datetimeFigureOut">
               <a:rPr lang="es-ES" smtClean="0"/>
-              <a:t>23/10/19</a:t>
+              <a:t>31/10/2019</a:t>
             </a:fld>
             <a:endParaRPr lang="es-ES"/>
           </a:p>
@@ -1096,7 +1549,7 @@
           <a:p>
             <a:fld id="{E3F820F1-0728-A74F-B087-595E4E205F26}" type="slidenum">
               <a:rPr lang="es-ES" smtClean="0"/>
-              <a:t>‹Nr.›</a:t>
+              <a:t>‹Nº›</a:t>
             </a:fld>
             <a:endParaRPr lang="es-ES"/>
           </a:p>
@@ -1342,7 +1795,7 @@
           <a:p>
             <a:fld id="{6311D5E6-ECD3-4240-9AD7-3B7A7170C22A}" type="datetimeFigureOut">
               <a:rPr lang="es-ES" smtClean="0"/>
-              <a:t>23/10/19</a:t>
+              <a:t>31/10/2019</a:t>
             </a:fld>
             <a:endParaRPr lang="es-ES"/>
           </a:p>
@@ -1384,7 +1837,7 @@
           <a:p>
             <a:fld id="{E3F820F1-0728-A74F-B087-595E4E205F26}" type="slidenum">
               <a:rPr lang="es-ES" smtClean="0"/>
-              <a:t>‹Nr.›</a:t>
+              <a:t>‹Nº›</a:t>
             </a:fld>
             <a:endParaRPr lang="es-ES"/>
           </a:p>
@@ -1769,7 +2222,7 @@
           <a:p>
             <a:fld id="{6311D5E6-ECD3-4240-9AD7-3B7A7170C22A}" type="datetimeFigureOut">
               <a:rPr lang="es-ES" smtClean="0"/>
-              <a:t>23/10/19</a:t>
+              <a:t>31/10/2019</a:t>
             </a:fld>
             <a:endParaRPr lang="es-ES"/>
           </a:p>
@@ -1811,7 +2264,7 @@
           <a:p>
             <a:fld id="{E3F820F1-0728-A74F-B087-595E4E205F26}" type="slidenum">
               <a:rPr lang="es-ES" smtClean="0"/>
-              <a:t>‹Nr.›</a:t>
+              <a:t>‹Nº›</a:t>
             </a:fld>
             <a:endParaRPr lang="es-ES"/>
           </a:p>
@@ -1887,7 +2340,7 @@
           <a:p>
             <a:fld id="{6311D5E6-ECD3-4240-9AD7-3B7A7170C22A}" type="datetimeFigureOut">
               <a:rPr lang="es-ES" smtClean="0"/>
-              <a:t>23/10/19</a:t>
+              <a:t>31/10/2019</a:t>
             </a:fld>
             <a:endParaRPr lang="es-ES"/>
           </a:p>
@@ -1929,7 +2382,7 @@
           <a:p>
             <a:fld id="{E3F820F1-0728-A74F-B087-595E4E205F26}" type="slidenum">
               <a:rPr lang="es-ES" smtClean="0"/>
-              <a:t>‹Nr.›</a:t>
+              <a:t>‹Nº›</a:t>
             </a:fld>
             <a:endParaRPr lang="es-ES"/>
           </a:p>
@@ -1982,7 +2435,7 @@
           <a:p>
             <a:fld id="{6311D5E6-ECD3-4240-9AD7-3B7A7170C22A}" type="datetimeFigureOut">
               <a:rPr lang="es-ES" smtClean="0"/>
-              <a:t>23/10/19</a:t>
+              <a:t>31/10/2019</a:t>
             </a:fld>
             <a:endParaRPr lang="es-ES"/>
           </a:p>
@@ -2024,7 +2477,7 @@
           <a:p>
             <a:fld id="{E3F820F1-0728-A74F-B087-595E4E205F26}" type="slidenum">
               <a:rPr lang="es-ES" smtClean="0"/>
-              <a:t>‹Nr.›</a:t>
+              <a:t>‹Nº›</a:t>
             </a:fld>
             <a:endParaRPr lang="es-ES"/>
           </a:p>
@@ -2259,7 +2712,7 @@
           <a:p>
             <a:fld id="{6311D5E6-ECD3-4240-9AD7-3B7A7170C22A}" type="datetimeFigureOut">
               <a:rPr lang="es-ES" smtClean="0"/>
-              <a:t>23/10/19</a:t>
+              <a:t>31/10/2019</a:t>
             </a:fld>
             <a:endParaRPr lang="es-ES"/>
           </a:p>
@@ -2301,7 +2754,7 @@
           <a:p>
             <a:fld id="{E3F820F1-0728-A74F-B087-595E4E205F26}" type="slidenum">
               <a:rPr lang="es-ES" smtClean="0"/>
-              <a:t>‹Nr.›</a:t>
+              <a:t>‹Nº›</a:t>
             </a:fld>
             <a:endParaRPr lang="es-ES"/>
           </a:p>
@@ -2512,7 +2965,7 @@
           <a:p>
             <a:fld id="{6311D5E6-ECD3-4240-9AD7-3B7A7170C22A}" type="datetimeFigureOut">
               <a:rPr lang="es-ES" smtClean="0"/>
-              <a:t>23/10/19</a:t>
+              <a:t>31/10/2019</a:t>
             </a:fld>
             <a:endParaRPr lang="es-ES"/>
           </a:p>
@@ -2554,7 +3007,7 @@
           <a:p>
             <a:fld id="{E3F820F1-0728-A74F-B087-595E4E205F26}" type="slidenum">
               <a:rPr lang="es-ES" smtClean="0"/>
-              <a:t>‹Nr.›</a:t>
+              <a:t>‹Nº›</a:t>
             </a:fld>
             <a:endParaRPr lang="es-ES"/>
           </a:p>
@@ -2731,7 +3184,7 @@
           <a:p>
             <a:fld id="{6311D5E6-ECD3-4240-9AD7-3B7A7170C22A}" type="datetimeFigureOut">
               <a:rPr lang="es-ES" smtClean="0"/>
-              <a:t>23/10/19</a:t>
+              <a:t>31/10/2019</a:t>
             </a:fld>
             <a:endParaRPr lang="es-ES"/>
           </a:p>
@@ -2809,7 +3262,7 @@
           <a:p>
             <a:fld id="{E3F820F1-0728-A74F-B087-595E4E205F26}" type="slidenum">
               <a:rPr lang="es-ES" smtClean="0"/>
-              <a:t>‹Nr.›</a:t>
+              <a:t>‹Nº›</a:t>
             </a:fld>
             <a:endParaRPr lang="es-ES"/>
           </a:p>
@@ -3108,62 +3561,37 @@
       </p:grpSpPr>
       <p:sp>
         <p:nvSpPr>
-          <p:cNvPr id="2" name="Título 1"/>
-          <p:cNvSpPr>
-            <a:spLocks noGrp="1"/>
-          </p:cNvSpPr>
-          <p:nvPr>
-            <p:ph type="ctrTitle"/>
+          <p:cNvPr id="3" name="Subtítulo 2"/>
+          <p:cNvSpPr>
+            <a:spLocks noGrp="1"/>
+          </p:cNvSpPr>
+          <p:nvPr>
+            <p:ph type="subTitle" idx="1"/>
           </p:nvPr>
         </p:nvSpPr>
         <p:spPr>
           <a:xfrm>
-            <a:off x="14772621" y="3700895"/>
-            <a:ext cx="4094222" cy="1846775"/>
+            <a:off x="2171700" y="20079544"/>
+            <a:ext cx="17365374" cy="4229968"/>
           </a:xfrm>
-        </p:spPr>
-        <p:txBody>
-          <a:bodyPr>
-            <a:normAutofit/>
-          </a:bodyPr>
-          <a:lstStyle/>
-          <a:p>
-            <a:r>
-              <a:rPr lang="es-ES" sz="4500" dirty="0" smtClean="0"/>
-              <a:t>Logo</a:t>
-            </a:r>
-            <a:br>
-              <a:rPr lang="es-ES" sz="4500" dirty="0" smtClean="0"/>
-            </a:br>
-            <a:r>
-              <a:rPr lang="es-ES" sz="4500" dirty="0" smtClean="0"/>
-              <a:t>Universidad</a:t>
-            </a:r>
-            <a:endParaRPr lang="es-ES" sz="4500" dirty="0"/>
-          </a:p>
-        </p:txBody>
-      </p:sp>
-      <p:sp>
-        <p:nvSpPr>
-          <p:cNvPr id="3" name="Subtítulo 2"/>
-          <p:cNvSpPr>
-            <a:spLocks noGrp="1"/>
-          </p:cNvSpPr>
-          <p:nvPr>
-            <p:ph type="subTitle" idx="1"/>
-          </p:nvPr>
-        </p:nvSpPr>
-        <p:spPr>
-          <a:xfrm>
-            <a:off x="2072177" y="6851037"/>
-            <a:ext cx="17346129" cy="20686791"/>
-          </a:xfrm>
+          <a:ln>
+            <a:solidFill>
+              <a:schemeClr val="tx1"/>
+            </a:solidFill>
+          </a:ln>
         </p:spPr>
         <p:txBody>
           <a:bodyPr/>
           <a:lstStyle/>
           <a:p>
-            <a:endParaRPr lang="es-ES"/>
+            <a:r>
+              <a:rPr lang="es-ES" sz="5400" u="sng" dirty="0" smtClean="0"/>
+              <a:t>Resultados</a:t>
+            </a:r>
+            <a:endParaRPr lang="es-ES" sz="5400" u="sng" dirty="0"/>
+          </a:p>
+          <a:p>
+            <a:endParaRPr lang="es-ES" dirty="0"/>
           </a:p>
         </p:txBody>
       </p:sp>
@@ -3175,8 +3603,8 @@
         </p:nvSpPr>
         <p:spPr>
           <a:xfrm>
-            <a:off x="2606933" y="4177462"/>
-            <a:ext cx="11731198" cy="1092607"/>
+            <a:off x="2606933" y="3337199"/>
+            <a:ext cx="11731198" cy="1015663"/>
           </a:xfrm>
           <a:prstGeom prst="rect">
             <a:avLst/>
@@ -3189,19 +3617,1106 @@
           </a:bodyPr>
           <a:lstStyle/>
           <a:p>
-            <a:r>
-              <a:rPr lang="es-ES" sz="6500" dirty="0" smtClean="0">
+            <a:pPr algn="ctr"/>
+            <a:r>
+              <a:rPr lang="es-ES" sz="6000" dirty="0" smtClean="0">
                 <a:solidFill>
                   <a:srgbClr val="151213"/>
                 </a:solidFill>
               </a:rPr>
               <a:t>Titulo Proyecto</a:t>
             </a:r>
-            <a:endParaRPr lang="es-ES" sz="6500" dirty="0">
+            <a:endParaRPr lang="es-ES" sz="6000" dirty="0">
               <a:solidFill>
                 <a:srgbClr val="151213"/>
               </a:solidFill>
             </a:endParaRPr>
+          </a:p>
+        </p:txBody>
+      </p:sp>
+      <p:sp>
+        <p:nvSpPr>
+          <p:cNvPr id="5" name="Título 1"/>
+          <p:cNvSpPr txBox="1">
+            <a:spLocks/>
+          </p:cNvSpPr>
+          <p:nvPr/>
+        </p:nvSpPr>
+        <p:spPr>
+          <a:xfrm>
+            <a:off x="14925021" y="3853295"/>
+            <a:ext cx="4094222" cy="1846775"/>
+          </a:xfrm>
+          <a:prstGeom prst="rect">
+            <a:avLst/>
+          </a:prstGeom>
+        </p:spPr>
+        <p:txBody>
+          <a:bodyPr vert="horz" lIns="288054" tIns="144027" rIns="288054" bIns="144027" rtlCol="0" anchor="ctr">
+            <a:normAutofit/>
+          </a:bodyPr>
+          <a:lstStyle>
+            <a:lvl1pPr algn="ctr" defTabSz="1440271" rtl="0" eaLnBrk="1" latinLnBrk="0" hangingPunct="1">
+              <a:spcBef>
+                <a:spcPct val="0"/>
+              </a:spcBef>
+              <a:buNone/>
+              <a:defRPr sz="13900" kern="1200">
+                <a:solidFill>
+                  <a:schemeClr val="tx1"/>
+                </a:solidFill>
+                <a:latin typeface="+mj-lt"/>
+                <a:ea typeface="+mj-ea"/>
+                <a:cs typeface="+mj-cs"/>
+              </a:defRPr>
+            </a:lvl1pPr>
+          </a:lstStyle>
+          <a:p>
+            <a:r>
+              <a:rPr lang="es-ES" sz="4500" smtClean="0"/>
+              <a:t>Logo</a:t>
+            </a:r>
+            <a:br>
+              <a:rPr lang="es-ES" sz="4500" smtClean="0"/>
+            </a:br>
+            <a:r>
+              <a:rPr lang="es-ES" sz="4500" smtClean="0"/>
+              <a:t>Universidad</a:t>
+            </a:r>
+            <a:endParaRPr lang="es-ES" sz="4500" dirty="0"/>
+          </a:p>
+        </p:txBody>
+      </p:sp>
+      <p:sp>
+        <p:nvSpPr>
+          <p:cNvPr id="6" name="Título 1"/>
+          <p:cNvSpPr txBox="1">
+            <a:spLocks/>
+          </p:cNvSpPr>
+          <p:nvPr/>
+        </p:nvSpPr>
+        <p:spPr>
+          <a:xfrm>
+            <a:off x="2606933" y="4352268"/>
+            <a:ext cx="12852844" cy="1498871"/>
+          </a:xfrm>
+          <a:prstGeom prst="rect">
+            <a:avLst/>
+          </a:prstGeom>
+        </p:spPr>
+        <p:txBody>
+          <a:bodyPr vert="horz" lIns="288054" tIns="144027" rIns="288054" bIns="144027" rtlCol="0" anchor="ctr">
+            <a:normAutofit/>
+          </a:bodyPr>
+          <a:lstStyle>
+            <a:lvl1pPr algn="ctr" defTabSz="1440271" rtl="0" eaLnBrk="1" latinLnBrk="0" hangingPunct="1">
+              <a:spcBef>
+                <a:spcPct val="0"/>
+              </a:spcBef>
+              <a:buNone/>
+              <a:defRPr sz="13900" kern="1200">
+                <a:solidFill>
+                  <a:schemeClr val="tx1"/>
+                </a:solidFill>
+                <a:latin typeface="+mj-lt"/>
+                <a:ea typeface="+mj-ea"/>
+                <a:cs typeface="+mj-cs"/>
+              </a:defRPr>
+            </a:lvl1pPr>
+          </a:lstStyle>
+          <a:p>
+            <a:r>
+              <a:rPr lang="es-ES" sz="3400" dirty="0" smtClean="0"/>
+              <a:t>Autores</a:t>
+            </a:r>
+            <a:endParaRPr lang="es-ES" sz="3400" dirty="0"/>
+          </a:p>
+        </p:txBody>
+      </p:sp>
+      <p:sp>
+        <p:nvSpPr>
+          <p:cNvPr id="7" name="Título 1"/>
+          <p:cNvSpPr txBox="1">
+            <a:spLocks/>
+          </p:cNvSpPr>
+          <p:nvPr/>
+        </p:nvSpPr>
+        <p:spPr>
+          <a:xfrm>
+            <a:off x="2128583" y="5933688"/>
+            <a:ext cx="8339875" cy="4473743"/>
+          </a:xfrm>
+          <a:prstGeom prst="rect">
+            <a:avLst/>
+          </a:prstGeom>
+          <a:ln>
+            <a:solidFill>
+              <a:schemeClr val="tx1"/>
+            </a:solidFill>
+          </a:ln>
+        </p:spPr>
+        <p:txBody>
+          <a:bodyPr vert="horz" lIns="288054" tIns="144027" rIns="288054" bIns="144027" rtlCol="0" anchor="ctr">
+            <a:normAutofit/>
+          </a:bodyPr>
+          <a:lstStyle>
+            <a:lvl1pPr algn="ctr" defTabSz="1440271" rtl="0" eaLnBrk="1" latinLnBrk="0" hangingPunct="1">
+              <a:spcBef>
+                <a:spcPct val="0"/>
+              </a:spcBef>
+              <a:buNone/>
+              <a:defRPr sz="13900" kern="1200">
+                <a:solidFill>
+                  <a:schemeClr val="tx1"/>
+                </a:solidFill>
+                <a:latin typeface="+mj-lt"/>
+                <a:ea typeface="+mj-ea"/>
+                <a:cs typeface="+mj-cs"/>
+              </a:defRPr>
+            </a:lvl1pPr>
+          </a:lstStyle>
+          <a:p>
+            <a:pPr algn="l">
+              <a:spcBef>
+                <a:spcPct val="20000"/>
+              </a:spcBef>
+            </a:pPr>
+            <a:r>
+              <a:rPr lang="es-ES" sz="5400" u="sng" dirty="0" smtClean="0">
+                <a:solidFill>
+                  <a:schemeClr val="tx1">
+                    <a:tint val="75000"/>
+                  </a:schemeClr>
+                </a:solidFill>
+                <a:latin typeface="+mn-lt"/>
+                <a:ea typeface="+mn-ea"/>
+                <a:cs typeface="+mn-cs"/>
+              </a:rPr>
+              <a:t>Resumen / </a:t>
+            </a:r>
+            <a:r>
+              <a:rPr lang="es-ES" sz="5400" u="sng" dirty="0" err="1" smtClean="0">
+                <a:solidFill>
+                  <a:schemeClr val="tx1">
+                    <a:tint val="75000"/>
+                  </a:schemeClr>
+                </a:solidFill>
+                <a:latin typeface="+mn-lt"/>
+                <a:ea typeface="+mn-ea"/>
+                <a:cs typeface="+mn-cs"/>
+              </a:rPr>
+              <a:t>Abstract</a:t>
+            </a:r>
+            <a:endParaRPr lang="es-ES" sz="5400" u="sng" dirty="0">
+              <a:solidFill>
+                <a:schemeClr val="tx1">
+                  <a:tint val="75000"/>
+                </a:schemeClr>
+              </a:solidFill>
+              <a:latin typeface="+mn-lt"/>
+              <a:ea typeface="+mn-ea"/>
+              <a:cs typeface="+mn-cs"/>
+            </a:endParaRPr>
+          </a:p>
+          <a:p>
+            <a:pPr algn="just"/>
+            <a:endParaRPr lang="es-ES" sz="4500" u="sng" dirty="0"/>
+          </a:p>
+          <a:p>
+            <a:pPr algn="just"/>
+            <a:endParaRPr lang="es-ES" sz="4500" u="sng" dirty="0" smtClean="0"/>
+          </a:p>
+          <a:p>
+            <a:pPr algn="just"/>
+            <a:endParaRPr lang="es-ES" sz="4500" u="sng" dirty="0"/>
+          </a:p>
+          <a:p>
+            <a:pPr algn="just"/>
+            <a:endParaRPr lang="es-ES" sz="4500" u="sng" dirty="0" smtClean="0"/>
+          </a:p>
+          <a:p>
+            <a:pPr algn="just"/>
+            <a:endParaRPr lang="es-ES" sz="4500" u="sng" dirty="0"/>
+          </a:p>
+        </p:txBody>
+      </p:sp>
+      <p:sp>
+        <p:nvSpPr>
+          <p:cNvPr id="8" name="Título 1"/>
+          <p:cNvSpPr txBox="1">
+            <a:spLocks/>
+          </p:cNvSpPr>
+          <p:nvPr/>
+        </p:nvSpPr>
+        <p:spPr>
+          <a:xfrm>
+            <a:off x="2171700" y="15416263"/>
+            <a:ext cx="8296758" cy="4395737"/>
+          </a:xfrm>
+          <a:prstGeom prst="rect">
+            <a:avLst/>
+          </a:prstGeom>
+          <a:ln>
+            <a:solidFill>
+              <a:schemeClr val="tx1"/>
+            </a:solidFill>
+          </a:ln>
+        </p:spPr>
+        <p:txBody>
+          <a:bodyPr vert="horz" lIns="288054" tIns="144027" rIns="288054" bIns="144027" rtlCol="0" anchor="ctr">
+            <a:normAutofit/>
+          </a:bodyPr>
+          <a:lstStyle>
+            <a:lvl1pPr algn="ctr" defTabSz="1440271" rtl="0" eaLnBrk="1" latinLnBrk="0" hangingPunct="1">
+              <a:spcBef>
+                <a:spcPct val="0"/>
+              </a:spcBef>
+              <a:buNone/>
+              <a:defRPr sz="13900" kern="1200">
+                <a:solidFill>
+                  <a:schemeClr val="tx1"/>
+                </a:solidFill>
+                <a:latin typeface="+mj-lt"/>
+                <a:ea typeface="+mj-ea"/>
+                <a:cs typeface="+mj-cs"/>
+              </a:defRPr>
+            </a:lvl1pPr>
+          </a:lstStyle>
+          <a:p>
+            <a:pPr algn="l">
+              <a:spcBef>
+                <a:spcPct val="20000"/>
+              </a:spcBef>
+            </a:pPr>
+            <a:r>
+              <a:rPr lang="es-ES" sz="5400" u="sng" dirty="0" smtClean="0">
+                <a:solidFill>
+                  <a:schemeClr val="tx1">
+                    <a:tint val="75000"/>
+                  </a:schemeClr>
+                </a:solidFill>
+                <a:latin typeface="+mn-lt"/>
+                <a:ea typeface="+mn-ea"/>
+                <a:cs typeface="+mn-cs"/>
+              </a:rPr>
+              <a:t>Beneficios / Objetivo</a:t>
+            </a:r>
+            <a:endParaRPr lang="es-ES" sz="5400" u="sng" dirty="0">
+              <a:solidFill>
+                <a:schemeClr val="tx1">
+                  <a:tint val="75000"/>
+                </a:schemeClr>
+              </a:solidFill>
+              <a:latin typeface="+mn-lt"/>
+              <a:ea typeface="+mn-ea"/>
+              <a:cs typeface="+mn-cs"/>
+            </a:endParaRPr>
+          </a:p>
+          <a:p>
+            <a:pPr algn="r"/>
+            <a:endParaRPr lang="es-ES" sz="4500" u="sng" dirty="0" smtClean="0"/>
+          </a:p>
+          <a:p>
+            <a:pPr algn="r"/>
+            <a:endParaRPr lang="es-ES" sz="4500" u="sng" dirty="0"/>
+          </a:p>
+          <a:p>
+            <a:pPr algn="r"/>
+            <a:endParaRPr lang="es-ES" sz="4500" u="sng" dirty="0"/>
+          </a:p>
+          <a:p>
+            <a:pPr algn="r"/>
+            <a:endParaRPr lang="es-ES" sz="4500" u="sng" dirty="0" smtClean="0"/>
+          </a:p>
+          <a:p>
+            <a:pPr algn="r"/>
+            <a:endParaRPr lang="es-ES" sz="4500" u="sng" dirty="0"/>
+          </a:p>
+        </p:txBody>
+      </p:sp>
+      <p:sp>
+        <p:nvSpPr>
+          <p:cNvPr id="9" name="Título 1"/>
+          <p:cNvSpPr txBox="1">
+            <a:spLocks/>
+          </p:cNvSpPr>
+          <p:nvPr/>
+        </p:nvSpPr>
+        <p:spPr>
+          <a:xfrm>
+            <a:off x="2128582" y="10608689"/>
+            <a:ext cx="8339875" cy="4578638"/>
+          </a:xfrm>
+          <a:prstGeom prst="rect">
+            <a:avLst/>
+          </a:prstGeom>
+          <a:ln>
+            <a:solidFill>
+              <a:schemeClr val="tx1"/>
+            </a:solidFill>
+          </a:ln>
+        </p:spPr>
+        <p:txBody>
+          <a:bodyPr vert="horz" lIns="288054" tIns="144027" rIns="288054" bIns="144027" rtlCol="0" anchor="ctr">
+            <a:normAutofit/>
+          </a:bodyPr>
+          <a:lstStyle>
+            <a:lvl1pPr algn="ctr" defTabSz="1440271" rtl="0" eaLnBrk="1" latinLnBrk="0" hangingPunct="1">
+              <a:spcBef>
+                <a:spcPct val="0"/>
+              </a:spcBef>
+              <a:buNone/>
+              <a:defRPr sz="13900" kern="1200">
+                <a:solidFill>
+                  <a:schemeClr val="tx1"/>
+                </a:solidFill>
+                <a:latin typeface="+mj-lt"/>
+                <a:ea typeface="+mj-ea"/>
+                <a:cs typeface="+mj-cs"/>
+              </a:defRPr>
+            </a:lvl1pPr>
+          </a:lstStyle>
+          <a:p>
+            <a:pPr algn="l">
+              <a:spcBef>
+                <a:spcPct val="20000"/>
+              </a:spcBef>
+            </a:pPr>
+            <a:r>
+              <a:rPr lang="es-ES" sz="5400" u="sng" dirty="0" smtClean="0">
+                <a:solidFill>
+                  <a:schemeClr val="tx1">
+                    <a:tint val="75000"/>
+                  </a:schemeClr>
+                </a:solidFill>
+                <a:latin typeface="+mn-lt"/>
+                <a:ea typeface="+mn-ea"/>
+                <a:cs typeface="+mn-cs"/>
+              </a:rPr>
+              <a:t>Propuesta</a:t>
+            </a:r>
+            <a:endParaRPr lang="es-ES" sz="5400" u="sng" dirty="0">
+              <a:solidFill>
+                <a:schemeClr val="tx1">
+                  <a:tint val="75000"/>
+                </a:schemeClr>
+              </a:solidFill>
+              <a:latin typeface="+mn-lt"/>
+              <a:ea typeface="+mn-ea"/>
+              <a:cs typeface="+mn-cs"/>
+            </a:endParaRPr>
+          </a:p>
+          <a:p>
+            <a:pPr algn="l"/>
+            <a:endParaRPr lang="es-ES" sz="4500" u="sng" dirty="0"/>
+          </a:p>
+          <a:p>
+            <a:pPr algn="l"/>
+            <a:endParaRPr lang="es-ES" sz="4500" u="sng" dirty="0" smtClean="0"/>
+          </a:p>
+          <a:p>
+            <a:pPr algn="l"/>
+            <a:endParaRPr lang="es-ES" sz="4500" u="sng" dirty="0"/>
+          </a:p>
+          <a:p>
+            <a:pPr algn="l"/>
+            <a:endParaRPr lang="es-ES" sz="4500" u="sng" dirty="0" smtClean="0"/>
+          </a:p>
+          <a:p>
+            <a:pPr algn="l"/>
+            <a:endParaRPr lang="es-ES" sz="4500" u="sng" dirty="0"/>
+          </a:p>
+        </p:txBody>
+      </p:sp>
+      <p:sp>
+        <p:nvSpPr>
+          <p:cNvPr id="10" name="Título 1"/>
+          <p:cNvSpPr txBox="1">
+            <a:spLocks/>
+          </p:cNvSpPr>
+          <p:nvPr/>
+        </p:nvSpPr>
+        <p:spPr>
+          <a:xfrm>
+            <a:off x="11213840" y="5812782"/>
+            <a:ext cx="8366708" cy="6351112"/>
+          </a:xfrm>
+          <a:prstGeom prst="rect">
+            <a:avLst/>
+          </a:prstGeom>
+          <a:ln>
+            <a:solidFill>
+              <a:schemeClr val="tx1"/>
+            </a:solidFill>
+          </a:ln>
+        </p:spPr>
+        <p:txBody>
+          <a:bodyPr vert="horz" lIns="288054" tIns="144027" rIns="288054" bIns="144027" rtlCol="0" anchor="ctr">
+            <a:normAutofit/>
+          </a:bodyPr>
+          <a:lstStyle>
+            <a:lvl1pPr algn="ctr" defTabSz="1440271" rtl="0" eaLnBrk="1" latinLnBrk="0" hangingPunct="1">
+              <a:spcBef>
+                <a:spcPct val="0"/>
+              </a:spcBef>
+              <a:buNone/>
+              <a:defRPr sz="13900" kern="1200">
+                <a:solidFill>
+                  <a:schemeClr val="tx1"/>
+                </a:solidFill>
+                <a:latin typeface="+mj-lt"/>
+                <a:ea typeface="+mj-ea"/>
+                <a:cs typeface="+mj-cs"/>
+              </a:defRPr>
+            </a:lvl1pPr>
+          </a:lstStyle>
+          <a:p>
+            <a:pPr algn="r">
+              <a:spcBef>
+                <a:spcPct val="20000"/>
+              </a:spcBef>
+            </a:pPr>
+            <a:r>
+              <a:rPr lang="es-ES" sz="5400" u="sng" dirty="0">
+                <a:solidFill>
+                  <a:schemeClr val="tx1">
+                    <a:tint val="75000"/>
+                  </a:schemeClr>
+                </a:solidFill>
+                <a:latin typeface="+mn-lt"/>
+                <a:ea typeface="+mn-ea"/>
+                <a:cs typeface="+mn-cs"/>
+              </a:rPr>
+              <a:t>Herramientas </a:t>
+            </a:r>
+            <a:r>
+              <a:rPr lang="es-ES" sz="5400" u="sng" dirty="0" smtClean="0">
+                <a:solidFill>
+                  <a:schemeClr val="tx1">
+                    <a:tint val="75000"/>
+                  </a:schemeClr>
+                </a:solidFill>
+                <a:latin typeface="+mn-lt"/>
+                <a:ea typeface="+mn-ea"/>
+                <a:cs typeface="+mn-cs"/>
+              </a:rPr>
+              <a:t>Tecnológicas</a:t>
+            </a:r>
+          </a:p>
+          <a:p>
+            <a:pPr algn="r">
+              <a:spcBef>
+                <a:spcPct val="20000"/>
+              </a:spcBef>
+            </a:pPr>
+            <a:endParaRPr lang="es-ES" sz="5400" u="sng" dirty="0">
+              <a:solidFill>
+                <a:schemeClr val="tx1">
+                  <a:tint val="75000"/>
+                </a:schemeClr>
+              </a:solidFill>
+              <a:latin typeface="+mn-lt"/>
+              <a:ea typeface="+mn-ea"/>
+              <a:cs typeface="+mn-cs"/>
+            </a:endParaRPr>
+          </a:p>
+          <a:p>
+            <a:pPr algn="r"/>
+            <a:endParaRPr lang="es-ES" sz="4500" u="sng" dirty="0" smtClean="0"/>
+          </a:p>
+          <a:p>
+            <a:pPr algn="r"/>
+            <a:endParaRPr lang="es-ES" sz="4500" u="sng" dirty="0"/>
+          </a:p>
+          <a:p>
+            <a:pPr algn="r"/>
+            <a:endParaRPr lang="es-ES" sz="4500" u="sng" dirty="0" smtClean="0"/>
+          </a:p>
+          <a:p>
+            <a:pPr algn="r"/>
+            <a:endParaRPr lang="es-ES" sz="4500" u="sng" dirty="0"/>
+          </a:p>
+          <a:p>
+            <a:pPr algn="r"/>
+            <a:endParaRPr lang="es-ES" sz="4500" u="sng" dirty="0" smtClean="0"/>
+          </a:p>
+          <a:p>
+            <a:pPr algn="r"/>
+            <a:endParaRPr lang="es-ES" sz="4500" u="sng" dirty="0"/>
+          </a:p>
+        </p:txBody>
+      </p:sp>
+      <p:sp>
+        <p:nvSpPr>
+          <p:cNvPr id="11" name="Subtítulo 2"/>
+          <p:cNvSpPr txBox="1">
+            <a:spLocks/>
+          </p:cNvSpPr>
+          <p:nvPr/>
+        </p:nvSpPr>
+        <p:spPr>
+          <a:xfrm>
+            <a:off x="2128583" y="24599831"/>
+            <a:ext cx="17346129" cy="2790977"/>
+          </a:xfrm>
+          <a:prstGeom prst="rect">
+            <a:avLst/>
+          </a:prstGeom>
+          <a:ln>
+            <a:solidFill>
+              <a:schemeClr val="tx1"/>
+            </a:solidFill>
+          </a:ln>
+        </p:spPr>
+        <p:txBody>
+          <a:bodyPr vert="horz" lIns="288054" tIns="144027" rIns="288054" bIns="144027" rtlCol="0">
+            <a:normAutofit/>
+          </a:bodyPr>
+          <a:lstStyle>
+            <a:lvl1pPr marL="0" indent="0" algn="ctr" defTabSz="1440271" rtl="0" eaLnBrk="1" latinLnBrk="0" hangingPunct="1">
+              <a:spcBef>
+                <a:spcPct val="20000"/>
+              </a:spcBef>
+              <a:buFont typeface="Arial"/>
+              <a:buNone/>
+              <a:defRPr sz="10100" kern="1200">
+                <a:solidFill>
+                  <a:schemeClr val="tx1">
+                    <a:tint val="75000"/>
+                  </a:schemeClr>
+                </a:solidFill>
+                <a:latin typeface="+mn-lt"/>
+                <a:ea typeface="+mn-ea"/>
+                <a:cs typeface="+mn-cs"/>
+              </a:defRPr>
+            </a:lvl1pPr>
+            <a:lvl2pPr marL="1440271" indent="0" algn="ctr" defTabSz="1440271" rtl="0" eaLnBrk="1" latinLnBrk="0" hangingPunct="1">
+              <a:spcBef>
+                <a:spcPct val="20000"/>
+              </a:spcBef>
+              <a:buFont typeface="Arial"/>
+              <a:buNone/>
+              <a:defRPr sz="8800" kern="1200">
+                <a:solidFill>
+                  <a:schemeClr val="tx1">
+                    <a:tint val="75000"/>
+                  </a:schemeClr>
+                </a:solidFill>
+                <a:latin typeface="+mn-lt"/>
+                <a:ea typeface="+mn-ea"/>
+                <a:cs typeface="+mn-cs"/>
+              </a:defRPr>
+            </a:lvl2pPr>
+            <a:lvl3pPr marL="2880543" indent="0" algn="ctr" defTabSz="1440271" rtl="0" eaLnBrk="1" latinLnBrk="0" hangingPunct="1">
+              <a:spcBef>
+                <a:spcPct val="20000"/>
+              </a:spcBef>
+              <a:buFont typeface="Arial"/>
+              <a:buNone/>
+              <a:defRPr sz="7600" kern="1200">
+                <a:solidFill>
+                  <a:schemeClr val="tx1">
+                    <a:tint val="75000"/>
+                  </a:schemeClr>
+                </a:solidFill>
+                <a:latin typeface="+mn-lt"/>
+                <a:ea typeface="+mn-ea"/>
+                <a:cs typeface="+mn-cs"/>
+              </a:defRPr>
+            </a:lvl3pPr>
+            <a:lvl4pPr marL="4320814" indent="0" algn="ctr" defTabSz="1440271" rtl="0" eaLnBrk="1" latinLnBrk="0" hangingPunct="1">
+              <a:spcBef>
+                <a:spcPct val="20000"/>
+              </a:spcBef>
+              <a:buFont typeface="Arial"/>
+              <a:buNone/>
+              <a:defRPr sz="6300" kern="1200">
+                <a:solidFill>
+                  <a:schemeClr val="tx1">
+                    <a:tint val="75000"/>
+                  </a:schemeClr>
+                </a:solidFill>
+                <a:latin typeface="+mn-lt"/>
+                <a:ea typeface="+mn-ea"/>
+                <a:cs typeface="+mn-cs"/>
+              </a:defRPr>
+            </a:lvl4pPr>
+            <a:lvl5pPr marL="5761086" indent="0" algn="ctr" defTabSz="1440271" rtl="0" eaLnBrk="1" latinLnBrk="0" hangingPunct="1">
+              <a:spcBef>
+                <a:spcPct val="20000"/>
+              </a:spcBef>
+              <a:buFont typeface="Arial"/>
+              <a:buNone/>
+              <a:defRPr sz="6300" kern="1200">
+                <a:solidFill>
+                  <a:schemeClr val="tx1">
+                    <a:tint val="75000"/>
+                  </a:schemeClr>
+                </a:solidFill>
+                <a:latin typeface="+mn-lt"/>
+                <a:ea typeface="+mn-ea"/>
+                <a:cs typeface="+mn-cs"/>
+              </a:defRPr>
+            </a:lvl5pPr>
+            <a:lvl6pPr marL="7201357" indent="0" algn="ctr" defTabSz="1440271" rtl="0" eaLnBrk="1" latinLnBrk="0" hangingPunct="1">
+              <a:spcBef>
+                <a:spcPct val="20000"/>
+              </a:spcBef>
+              <a:buFont typeface="Arial"/>
+              <a:buNone/>
+              <a:defRPr sz="6300" kern="1200">
+                <a:solidFill>
+                  <a:schemeClr val="tx1">
+                    <a:tint val="75000"/>
+                  </a:schemeClr>
+                </a:solidFill>
+                <a:latin typeface="+mn-lt"/>
+                <a:ea typeface="+mn-ea"/>
+                <a:cs typeface="+mn-cs"/>
+              </a:defRPr>
+            </a:lvl6pPr>
+            <a:lvl7pPr marL="8641629" indent="0" algn="ctr" defTabSz="1440271" rtl="0" eaLnBrk="1" latinLnBrk="0" hangingPunct="1">
+              <a:spcBef>
+                <a:spcPct val="20000"/>
+              </a:spcBef>
+              <a:buFont typeface="Arial"/>
+              <a:buNone/>
+              <a:defRPr sz="6300" kern="1200">
+                <a:solidFill>
+                  <a:schemeClr val="tx1">
+                    <a:tint val="75000"/>
+                  </a:schemeClr>
+                </a:solidFill>
+                <a:latin typeface="+mn-lt"/>
+                <a:ea typeface="+mn-ea"/>
+                <a:cs typeface="+mn-cs"/>
+              </a:defRPr>
+            </a:lvl7pPr>
+            <a:lvl8pPr marL="10081900" indent="0" algn="ctr" defTabSz="1440271" rtl="0" eaLnBrk="1" latinLnBrk="0" hangingPunct="1">
+              <a:spcBef>
+                <a:spcPct val="20000"/>
+              </a:spcBef>
+              <a:buFont typeface="Arial"/>
+              <a:buNone/>
+              <a:defRPr sz="6300" kern="1200">
+                <a:solidFill>
+                  <a:schemeClr val="tx1">
+                    <a:tint val="75000"/>
+                  </a:schemeClr>
+                </a:solidFill>
+                <a:latin typeface="+mn-lt"/>
+                <a:ea typeface="+mn-ea"/>
+                <a:cs typeface="+mn-cs"/>
+              </a:defRPr>
+            </a:lvl8pPr>
+            <a:lvl9pPr marL="11522172" indent="0" algn="ctr" defTabSz="1440271" rtl="0" eaLnBrk="1" latinLnBrk="0" hangingPunct="1">
+              <a:spcBef>
+                <a:spcPct val="20000"/>
+              </a:spcBef>
+              <a:buFont typeface="Arial"/>
+              <a:buNone/>
+              <a:defRPr sz="6300" kern="1200">
+                <a:solidFill>
+                  <a:schemeClr val="tx1">
+                    <a:tint val="75000"/>
+                  </a:schemeClr>
+                </a:solidFill>
+                <a:latin typeface="+mn-lt"/>
+                <a:ea typeface="+mn-ea"/>
+                <a:cs typeface="+mn-cs"/>
+              </a:defRPr>
+            </a:lvl9pPr>
+          </a:lstStyle>
+          <a:p>
+            <a:r>
+              <a:rPr lang="es-ES" sz="5400" u="sng" dirty="0" smtClean="0"/>
+              <a:t>Conclusiones </a:t>
+            </a:r>
+          </a:p>
+          <a:p>
+            <a:endParaRPr lang="es-ES" dirty="0"/>
+          </a:p>
+        </p:txBody>
+      </p:sp>
+      <p:sp>
+        <p:nvSpPr>
+          <p:cNvPr id="12" name="Título 1"/>
+          <p:cNvSpPr txBox="1">
+            <a:spLocks/>
+          </p:cNvSpPr>
+          <p:nvPr/>
+        </p:nvSpPr>
+        <p:spPr>
+          <a:xfrm>
+            <a:off x="11213840" y="12756552"/>
+            <a:ext cx="8366707" cy="7055448"/>
+          </a:xfrm>
+          <a:prstGeom prst="rect">
+            <a:avLst/>
+          </a:prstGeom>
+          <a:ln>
+            <a:solidFill>
+              <a:schemeClr val="tx1"/>
+            </a:solidFill>
+          </a:ln>
+        </p:spPr>
+        <p:txBody>
+          <a:bodyPr vert="horz" lIns="288054" tIns="144027" rIns="288054" bIns="144027" rtlCol="0" anchor="ctr">
+            <a:normAutofit/>
+          </a:bodyPr>
+          <a:lstStyle>
+            <a:lvl1pPr algn="ctr" defTabSz="1440271" rtl="0" eaLnBrk="1" latinLnBrk="0" hangingPunct="1">
+              <a:spcBef>
+                <a:spcPct val="0"/>
+              </a:spcBef>
+              <a:buNone/>
+              <a:defRPr sz="13900" kern="1200">
+                <a:solidFill>
+                  <a:schemeClr val="tx1"/>
+                </a:solidFill>
+                <a:latin typeface="+mj-lt"/>
+                <a:ea typeface="+mj-ea"/>
+                <a:cs typeface="+mj-cs"/>
+              </a:defRPr>
+            </a:lvl1pPr>
+          </a:lstStyle>
+          <a:p>
+            <a:pPr algn="r">
+              <a:spcBef>
+                <a:spcPct val="20000"/>
+              </a:spcBef>
+            </a:pPr>
+            <a:r>
+              <a:rPr lang="es-ES" sz="5400" u="sng" dirty="0">
+                <a:solidFill>
+                  <a:schemeClr val="tx1">
+                    <a:tint val="75000"/>
+                  </a:schemeClr>
+                </a:solidFill>
+                <a:latin typeface="+mn-lt"/>
+                <a:ea typeface="+mn-ea"/>
+                <a:cs typeface="+mn-cs"/>
+              </a:rPr>
+              <a:t>Herramientas Open </a:t>
+            </a:r>
+            <a:r>
+              <a:rPr lang="es-ES" sz="5400" u="sng" dirty="0" err="1" smtClean="0">
+                <a:solidFill>
+                  <a:schemeClr val="tx1">
+                    <a:tint val="75000"/>
+                  </a:schemeClr>
+                </a:solidFill>
+                <a:latin typeface="+mn-lt"/>
+                <a:ea typeface="+mn-ea"/>
+                <a:cs typeface="+mn-cs"/>
+              </a:rPr>
+              <a:t>Source</a:t>
+            </a:r>
+            <a:endParaRPr lang="es-ES" sz="5400" u="sng" dirty="0" smtClean="0">
+              <a:solidFill>
+                <a:schemeClr val="tx1">
+                  <a:tint val="75000"/>
+                </a:schemeClr>
+              </a:solidFill>
+              <a:latin typeface="+mn-lt"/>
+              <a:ea typeface="+mn-ea"/>
+              <a:cs typeface="+mn-cs"/>
+            </a:endParaRPr>
+          </a:p>
+          <a:p>
+            <a:pPr algn="r">
+              <a:spcBef>
+                <a:spcPct val="20000"/>
+              </a:spcBef>
+            </a:pPr>
+            <a:endParaRPr lang="es-ES" sz="5400" u="sng" dirty="0">
+              <a:solidFill>
+                <a:schemeClr val="tx1">
+                  <a:tint val="75000"/>
+                </a:schemeClr>
+              </a:solidFill>
+              <a:latin typeface="+mn-lt"/>
+              <a:ea typeface="+mn-ea"/>
+              <a:cs typeface="+mn-cs"/>
+            </a:endParaRPr>
+          </a:p>
+          <a:p>
+            <a:pPr algn="r">
+              <a:spcBef>
+                <a:spcPct val="20000"/>
+              </a:spcBef>
+            </a:pPr>
+            <a:endParaRPr lang="es-ES" sz="5400" u="sng" dirty="0">
+              <a:solidFill>
+                <a:schemeClr val="tx1">
+                  <a:tint val="75000"/>
+                </a:schemeClr>
+              </a:solidFill>
+              <a:latin typeface="+mn-lt"/>
+              <a:ea typeface="+mn-ea"/>
+              <a:cs typeface="+mn-cs"/>
+            </a:endParaRPr>
+          </a:p>
+          <a:p>
+            <a:pPr algn="r"/>
+            <a:endParaRPr lang="es-ES" sz="4500" u="sng" dirty="0" smtClean="0"/>
+          </a:p>
+          <a:p>
+            <a:pPr algn="r"/>
+            <a:endParaRPr lang="es-ES" sz="4500" u="sng" dirty="0"/>
+          </a:p>
+          <a:p>
+            <a:pPr algn="r"/>
+            <a:endParaRPr lang="es-ES" sz="4500" u="sng" dirty="0" smtClean="0"/>
+          </a:p>
+          <a:p>
+            <a:pPr algn="r"/>
+            <a:endParaRPr lang="es-ES" sz="4500" u="sng" dirty="0"/>
+          </a:p>
+          <a:p>
+            <a:pPr algn="r"/>
+            <a:endParaRPr lang="es-ES" sz="4500" u="sng" dirty="0" smtClean="0"/>
+          </a:p>
+          <a:p>
+            <a:pPr algn="r"/>
+            <a:endParaRPr lang="es-ES" sz="4500" u="sng" dirty="0"/>
+          </a:p>
+        </p:txBody>
+      </p:sp>
+      <p:sp>
+        <p:nvSpPr>
+          <p:cNvPr id="13" name="Rectángulo 12"/>
+          <p:cNvSpPr/>
+          <p:nvPr/>
+        </p:nvSpPr>
+        <p:spPr bwMode="auto">
+          <a:xfrm>
+            <a:off x="13226625" y="27546131"/>
+            <a:ext cx="1800000" cy="1080000"/>
+          </a:xfrm>
+          <a:prstGeom prst="rect">
+            <a:avLst/>
+          </a:prstGeom>
+          <a:noFill/>
+          <a:ln>
+            <a:headEnd type="none" w="med" len="med"/>
+            <a:tailEnd type="none" w="med" len="med"/>
+          </a:ln>
+        </p:spPr>
+        <p:style>
+          <a:lnRef idx="2">
+            <a:schemeClr val="dk1"/>
+          </a:lnRef>
+          <a:fillRef idx="1">
+            <a:schemeClr val="lt1"/>
+          </a:fillRef>
+          <a:effectRef idx="0">
+            <a:schemeClr val="dk1"/>
+          </a:effectRef>
+          <a:fontRef idx="minor">
+            <a:schemeClr val="dk1"/>
+          </a:fontRef>
+        </p:style>
+        <p:txBody>
+          <a:bodyPr vert="horz" wrap="square" lIns="91440" tIns="45720" rIns="91440" bIns="45720" numCol="1" rtlCol="0" anchor="t" anchorCtr="0" compatLnSpc="1">
+            <a:prstTxWarp prst="textNoShape">
+              <a:avLst/>
+            </a:prstTxWarp>
+          </a:bodyPr>
+          <a:lstStyle/>
+          <a:p>
+            <a:pPr marL="0" marR="0" indent="0" algn="l" defTabSz="914400" rtl="0" eaLnBrk="0" fontAlgn="base" latinLnBrk="0" hangingPunct="0">
+              <a:lnSpc>
+                <a:spcPct val="100000"/>
+              </a:lnSpc>
+              <a:spcBef>
+                <a:spcPct val="0"/>
+              </a:spcBef>
+              <a:spcAft>
+                <a:spcPct val="0"/>
+              </a:spcAft>
+              <a:buClrTx/>
+              <a:buSzTx/>
+              <a:buFontTx/>
+              <a:buNone/>
+              <a:tabLst/>
+            </a:pPr>
+            <a:r>
+              <a:rPr kumimoji="0" lang="es-MX" sz="3600" b="0" i="0" u="none" strike="noStrike" cap="none" normalizeH="0" baseline="0" dirty="0">
+                <a:ln>
+                  <a:noFill/>
+                </a:ln>
+                <a:solidFill>
+                  <a:schemeClr val="tx1"/>
+                </a:solidFill>
+                <a:effectLst/>
+                <a:latin typeface="Times New Roman" pitchFamily="18" charset="0"/>
+              </a:rPr>
+              <a:t>1</a:t>
+            </a:r>
+          </a:p>
+        </p:txBody>
+      </p:sp>
+      <p:sp>
+        <p:nvSpPr>
+          <p:cNvPr id="14" name="Rectángulo 13"/>
+          <p:cNvSpPr/>
+          <p:nvPr/>
+        </p:nvSpPr>
+        <p:spPr bwMode="auto">
+          <a:xfrm>
+            <a:off x="15420921" y="27546131"/>
+            <a:ext cx="1800000" cy="1080000"/>
+          </a:xfrm>
+          <a:prstGeom prst="rect">
+            <a:avLst/>
+          </a:prstGeom>
+          <a:noFill/>
+          <a:ln>
+            <a:headEnd type="none" w="med" len="med"/>
+            <a:tailEnd type="none" w="med" len="med"/>
+          </a:ln>
+        </p:spPr>
+        <p:style>
+          <a:lnRef idx="2">
+            <a:schemeClr val="dk1"/>
+          </a:lnRef>
+          <a:fillRef idx="1">
+            <a:schemeClr val="lt1"/>
+          </a:fillRef>
+          <a:effectRef idx="0">
+            <a:schemeClr val="dk1"/>
+          </a:effectRef>
+          <a:fontRef idx="minor">
+            <a:schemeClr val="dk1"/>
+          </a:fontRef>
+        </p:style>
+        <p:txBody>
+          <a:bodyPr vert="horz" wrap="square" lIns="91440" tIns="45720" rIns="91440" bIns="45720" numCol="1" rtlCol="0" anchor="t" anchorCtr="0" compatLnSpc="1">
+            <a:prstTxWarp prst="textNoShape">
+              <a:avLst/>
+            </a:prstTxWarp>
+          </a:bodyPr>
+          <a:lstStyle/>
+          <a:p>
+            <a:pPr defTabSz="914400" eaLnBrk="0" fontAlgn="base" hangingPunct="0">
+              <a:spcBef>
+                <a:spcPct val="0"/>
+              </a:spcBef>
+              <a:spcAft>
+                <a:spcPct val="0"/>
+              </a:spcAft>
+            </a:pPr>
+            <a:r>
+              <a:rPr lang="es-MX" sz="3600" dirty="0">
+                <a:solidFill>
+                  <a:schemeClr val="tx1"/>
+                </a:solidFill>
+                <a:latin typeface="Times New Roman" pitchFamily="18" charset="0"/>
+              </a:rPr>
+              <a:t>2</a:t>
+            </a:r>
+          </a:p>
+        </p:txBody>
+      </p:sp>
+      <p:sp>
+        <p:nvSpPr>
+          <p:cNvPr id="15" name="Rectángulo 14"/>
+          <p:cNvSpPr/>
+          <p:nvPr/>
+        </p:nvSpPr>
+        <p:spPr bwMode="auto">
+          <a:xfrm>
+            <a:off x="17653712" y="27546131"/>
+            <a:ext cx="1800000" cy="1080000"/>
+          </a:xfrm>
+          <a:prstGeom prst="rect">
+            <a:avLst/>
+          </a:prstGeom>
+          <a:noFill/>
+          <a:ln>
+            <a:headEnd type="none" w="med" len="med"/>
+            <a:tailEnd type="none" w="med" len="med"/>
+          </a:ln>
+        </p:spPr>
+        <p:style>
+          <a:lnRef idx="2">
+            <a:schemeClr val="dk1"/>
+          </a:lnRef>
+          <a:fillRef idx="1">
+            <a:schemeClr val="lt1"/>
+          </a:fillRef>
+          <a:effectRef idx="0">
+            <a:schemeClr val="dk1"/>
+          </a:effectRef>
+          <a:fontRef idx="minor">
+            <a:schemeClr val="dk1"/>
+          </a:fontRef>
+        </p:style>
+        <p:txBody>
+          <a:bodyPr vert="horz" wrap="square" lIns="91440" tIns="45720" rIns="91440" bIns="45720" numCol="1" rtlCol="0" anchor="t" anchorCtr="0" compatLnSpc="1">
+            <a:prstTxWarp prst="textNoShape">
+              <a:avLst/>
+            </a:prstTxWarp>
+          </a:bodyPr>
+          <a:lstStyle/>
+          <a:p>
+            <a:pPr defTabSz="914400" eaLnBrk="0" fontAlgn="base" hangingPunct="0">
+              <a:spcBef>
+                <a:spcPct val="0"/>
+              </a:spcBef>
+              <a:spcAft>
+                <a:spcPct val="0"/>
+              </a:spcAft>
+            </a:pPr>
+            <a:r>
+              <a:rPr lang="es-MX" sz="3600" dirty="0">
+                <a:solidFill>
+                  <a:schemeClr val="tx1"/>
+                </a:solidFill>
+                <a:latin typeface="Times New Roman" pitchFamily="18" charset="0"/>
+              </a:rPr>
+              <a:t>3</a:t>
+            </a:r>
+          </a:p>
+        </p:txBody>
+      </p:sp>
+      <p:sp>
+        <p:nvSpPr>
+          <p:cNvPr id="16" name="CuadroTexto 15"/>
+          <p:cNvSpPr txBox="1"/>
+          <p:nvPr/>
+        </p:nvSpPr>
+        <p:spPr>
+          <a:xfrm>
+            <a:off x="8061692" y="27918245"/>
+            <a:ext cx="5479909" cy="707886"/>
+          </a:xfrm>
+          <a:prstGeom prst="rect">
+            <a:avLst/>
+          </a:prstGeom>
+          <a:noFill/>
+        </p:spPr>
+        <p:txBody>
+          <a:bodyPr wrap="square" rtlCol="0">
+            <a:spAutoFit/>
+          </a:bodyPr>
+          <a:lstStyle/>
+          <a:p>
+            <a:r>
+              <a:rPr lang="es-MX" sz="4000" u="sng" dirty="0">
+                <a:solidFill>
+                  <a:schemeClr val="tx1">
+                    <a:tint val="75000"/>
+                  </a:schemeClr>
+                </a:solidFill>
+              </a:rPr>
+              <a:t>FIRMA EVALUADORES</a:t>
+            </a:r>
+            <a:r>
+              <a:rPr lang="es-MX" sz="4000" dirty="0"/>
+              <a:t>:</a:t>
+            </a:r>
           </a:p>
         </p:txBody>
       </p:sp>
@@ -3536,4 +5051,265 @@
   </a:objectDefaults>
   <a:extraClrSchemeLst/>
 </a:theme>
+</file>
+
+<file path=ppt/theme/theme2.xml><?xml version="1.0" encoding="utf-8"?>
+<a:theme xmlns:a="http://schemas.openxmlformats.org/drawingml/2006/main" name="Tema de Office">
+  <a:themeElements>
+    <a:clrScheme name="Office">
+      <a:dk1>
+        <a:sysClr val="windowText" lastClr="000000"/>
+      </a:dk1>
+      <a:lt1>
+        <a:sysClr val="window" lastClr="FFFFFF"/>
+      </a:lt1>
+      <a:dk2>
+        <a:srgbClr val="44546A"/>
+      </a:dk2>
+      <a:lt2>
+        <a:srgbClr val="E7E6E6"/>
+      </a:lt2>
+      <a:accent1>
+        <a:srgbClr val="5B9BD5"/>
+      </a:accent1>
+      <a:accent2>
+        <a:srgbClr val="ED7D31"/>
+      </a:accent2>
+      <a:accent3>
+        <a:srgbClr val="A5A5A5"/>
+      </a:accent3>
+      <a:accent4>
+        <a:srgbClr val="FFC000"/>
+      </a:accent4>
+      <a:accent5>
+        <a:srgbClr val="4472C4"/>
+      </a:accent5>
+      <a:accent6>
+        <a:srgbClr val="70AD47"/>
+      </a:accent6>
+      <a:hlink>
+        <a:srgbClr val="0563C1"/>
+      </a:hlink>
+      <a:folHlink>
+        <a:srgbClr val="954F72"/>
+      </a:folHlink>
+    </a:clrScheme>
+    <a:fontScheme name="Office">
+      <a:majorFont>
+        <a:latin typeface="Calibri Light" panose="020F0302020204030204"/>
+        <a:ea typeface=""/>
+        <a:cs typeface=""/>
+        <a:font script="Jpan" typeface="ＭＳ Ｐゴシック"/>
+        <a:font script="Hang" typeface="맑은 고딕"/>
+        <a:font script="Hans" typeface="宋体"/>
+        <a:font script="Hant" typeface="新細明體"/>
+        <a:font script="Arab" typeface="Times New Roman"/>
+        <a:font script="Hebr" typeface="Times New Roman"/>
+        <a:font script="Thai" typeface="Angsana New"/>
+        <a:font script="Ethi" typeface="Nyala"/>
+        <a:font script="Beng" typeface="Vrinda"/>
+        <a:font script="Gujr" typeface="Shruti"/>
+        <a:font script="Khmr" typeface="MoolBoran"/>
+        <a:font script="Knda" typeface="Tunga"/>
+        <a:font script="Guru" typeface="Raavi"/>
+        <a:font script="Cans" typeface="Euphemia"/>
+        <a:font script="Cher" typeface="Plantagenet Cherokee"/>
+        <a:font script="Yiii" typeface="Microsoft Yi Baiti"/>
+        <a:font script="Tibt" typeface="Microsoft Himalaya"/>
+        <a:font script="Thaa" typeface="MV Boli"/>
+        <a:font script="Deva" typeface="Mangal"/>
+        <a:font script="Telu" typeface="Gautami"/>
+        <a:font script="Taml" typeface="Latha"/>
+        <a:font script="Syrc" typeface="Estrangelo Edessa"/>
+        <a:font script="Orya" typeface="Kalinga"/>
+        <a:font script="Mlym" typeface="Kartika"/>
+        <a:font script="Laoo" typeface="DokChampa"/>
+        <a:font script="Sinh" typeface="Iskoola Pota"/>
+        <a:font script="Mong" typeface="Mongolian Baiti"/>
+        <a:font script="Viet" typeface="Times New Roman"/>
+        <a:font script="Uigh" typeface="Microsoft Uighur"/>
+        <a:font script="Geor" typeface="Sylfaen"/>
+      </a:majorFont>
+      <a:minorFont>
+        <a:latin typeface="Calibri" panose="020F0502020204030204"/>
+        <a:ea typeface=""/>
+        <a:cs typeface=""/>
+        <a:font script="Jpan" typeface="ＭＳ Ｐゴシック"/>
+        <a:font script="Hang" typeface="맑은 고딕"/>
+        <a:font script="Hans" typeface="宋体"/>
+        <a:font script="Hant" typeface="新細明體"/>
+        <a:font script="Arab" typeface="Arial"/>
+        <a:font script="Hebr" typeface="Arial"/>
+        <a:font script="Thai" typeface="Cordia New"/>
+        <a:font script="Ethi" typeface="Nyala"/>
+        <a:font script="Beng" typeface="Vrinda"/>
+        <a:font script="Gujr" typeface="Shruti"/>
+        <a:font script="Khmr" typeface="DaunPenh"/>
+        <a:font script="Knda" typeface="Tunga"/>
+        <a:font script="Guru" typeface="Raavi"/>
+        <a:font script="Cans" typeface="Euphemia"/>
+        <a:font script="Cher" typeface="Plantagenet Cherokee"/>
+        <a:font script="Yiii" typeface="Microsoft Yi Baiti"/>
+        <a:font script="Tibt" typeface="Microsoft Himalaya"/>
+        <a:font script="Thaa" typeface="MV Boli"/>
+        <a:font script="Deva" typeface="Mangal"/>
+        <a:font script="Telu" typeface="Gautami"/>
+        <a:font script="Taml" typeface="Latha"/>
+        <a:font script="Syrc" typeface="Estrangelo Edessa"/>
+        <a:font script="Orya" typeface="Kalinga"/>
+        <a:font script="Mlym" typeface="Kartika"/>
+        <a:font script="Laoo" typeface="DokChampa"/>
+        <a:font script="Sinh" typeface="Iskoola Pota"/>
+        <a:font script="Mong" typeface="Mongolian Baiti"/>
+        <a:font script="Viet" typeface="Arial"/>
+        <a:font script="Uigh" typeface="Microsoft Uighur"/>
+        <a:font script="Geor" typeface="Sylfaen"/>
+      </a:minorFont>
+    </a:fontScheme>
+    <a:fmtScheme name="Office">
+      <a:fillStyleLst>
+        <a:solidFill>
+          <a:schemeClr val="phClr"/>
+        </a:solidFill>
+        <a:gradFill rotWithShape="1">
+          <a:gsLst>
+            <a:gs pos="0">
+              <a:schemeClr val="phClr">
+                <a:lumMod val="110000"/>
+                <a:satMod val="105000"/>
+                <a:tint val="67000"/>
+              </a:schemeClr>
+            </a:gs>
+            <a:gs pos="50000">
+              <a:schemeClr val="phClr">
+                <a:lumMod val="105000"/>
+                <a:satMod val="103000"/>
+                <a:tint val="73000"/>
+              </a:schemeClr>
+            </a:gs>
+            <a:gs pos="100000">
+              <a:schemeClr val="phClr">
+                <a:lumMod val="105000"/>
+                <a:satMod val="109000"/>
+                <a:tint val="81000"/>
+              </a:schemeClr>
+            </a:gs>
+          </a:gsLst>
+          <a:lin ang="5400000" scaled="0"/>
+        </a:gradFill>
+        <a:gradFill rotWithShape="1">
+          <a:gsLst>
+            <a:gs pos="0">
+              <a:schemeClr val="phClr">
+                <a:satMod val="103000"/>
+                <a:lumMod val="102000"/>
+                <a:tint val="94000"/>
+              </a:schemeClr>
+            </a:gs>
+            <a:gs pos="50000">
+              <a:schemeClr val="phClr">
+                <a:satMod val="110000"/>
+                <a:lumMod val="100000"/>
+                <a:shade val="100000"/>
+              </a:schemeClr>
+            </a:gs>
+            <a:gs pos="100000">
+              <a:schemeClr val="phClr">
+                <a:lumMod val="99000"/>
+                <a:satMod val="120000"/>
+                <a:shade val="78000"/>
+              </a:schemeClr>
+            </a:gs>
+          </a:gsLst>
+          <a:lin ang="5400000" scaled="0"/>
+        </a:gradFill>
+      </a:fillStyleLst>
+      <a:lnStyleLst>
+        <a:ln w="6350" cap="flat" cmpd="sng" algn="ctr">
+          <a:solidFill>
+            <a:schemeClr val="phClr"/>
+          </a:solidFill>
+          <a:prstDash val="solid"/>
+          <a:miter lim="800000"/>
+        </a:ln>
+        <a:ln w="12700" cap="flat" cmpd="sng" algn="ctr">
+          <a:solidFill>
+            <a:schemeClr val="phClr"/>
+          </a:solidFill>
+          <a:prstDash val="solid"/>
+          <a:miter lim="800000"/>
+        </a:ln>
+        <a:ln w="19050" cap="flat" cmpd="sng" algn="ctr">
+          <a:solidFill>
+            <a:schemeClr val="phClr"/>
+          </a:solidFill>
+          <a:prstDash val="solid"/>
+          <a:miter lim="800000"/>
+        </a:ln>
+      </a:lnStyleLst>
+      <a:effectStyleLst>
+        <a:effectStyle>
+          <a:effectLst/>
+        </a:effectStyle>
+        <a:effectStyle>
+          <a:effectLst/>
+        </a:effectStyle>
+        <a:effectStyle>
+          <a:effectLst>
+            <a:outerShdw blurRad="57150" dist="19050" dir="5400000" algn="ctr" rotWithShape="0">
+              <a:srgbClr val="000000">
+                <a:alpha val="63000"/>
+              </a:srgbClr>
+            </a:outerShdw>
+          </a:effectLst>
+        </a:effectStyle>
+      </a:effectStyleLst>
+      <a:bgFillStyleLst>
+        <a:solidFill>
+          <a:schemeClr val="phClr"/>
+        </a:solidFill>
+        <a:solidFill>
+          <a:schemeClr val="phClr">
+            <a:tint val="95000"/>
+            <a:satMod val="170000"/>
+          </a:schemeClr>
+        </a:solidFill>
+        <a:gradFill rotWithShape="1">
+          <a:gsLst>
+            <a:gs pos="0">
+              <a:schemeClr val="phClr">
+                <a:tint val="93000"/>
+                <a:satMod val="150000"/>
+                <a:shade val="98000"/>
+                <a:lumMod val="102000"/>
+              </a:schemeClr>
+            </a:gs>
+            <a:gs pos="50000">
+              <a:schemeClr val="phClr">
+                <a:tint val="98000"/>
+                <a:satMod val="130000"/>
+                <a:shade val="90000"/>
+                <a:lumMod val="103000"/>
+              </a:schemeClr>
+            </a:gs>
+            <a:gs pos="100000">
+              <a:schemeClr val="phClr">
+                <a:shade val="63000"/>
+                <a:satMod val="120000"/>
+              </a:schemeClr>
+            </a:gs>
+          </a:gsLst>
+          <a:lin ang="5400000" scaled="0"/>
+        </a:gradFill>
+      </a:bgFillStyleLst>
+    </a:fmtScheme>
+  </a:themeElements>
+  <a:objectDefaults/>
+  <a:extraClrSchemeLst/>
+  <a:extLst>
+    <a:ext uri="{05A4C25C-085E-4340-85A3-A5531E510DB2}">
+      <thm15:themeFamily xmlns:thm15="http://schemas.microsoft.com/office/thememl/2012/main" name="Office Theme" id="{62F939B6-93AF-4DB8-9C6B-D6C7DFDC589F}" vid="{4A3C46E8-61CC-4603-A589-7422A47A8E4A}"/>
+    </a:ext>
+  </a:extLst>
+</a:theme>
 </file>
</xml_diff>